<commit_message>
26-31 (not all dry)
</commit_message>
<xml_diff>
--- a/hw_1/other/imgs.pptx
+++ b/hw_1/other/imgs.pptx
@@ -6,6 +6,7 @@
   </p:sldMasterIdLst>
   <p:sldIdLst>
     <p:sldId id="256" r:id="rId2"/>
+    <p:sldId id="257" r:id="rId3"/>
   </p:sldIdLst>
   <p:sldSz cx="12192000" cy="6858000"/>
   <p:notesSz cx="6858000" cy="9144000"/>
@@ -104,6 +105,11 @@
       </a:defRPr>
     </a:lvl9pPr>
   </p:defaultTextStyle>
+  <p:extLst>
+    <p:ext uri="{EFAFB233-063F-42B5-8137-9DF3F51BA10A}">
+      <p15:sldGuideLst xmlns:p15="http://schemas.microsoft.com/office/powerpoint/2012/main"/>
+    </p:ext>
+  </p:extLst>
 </p:presentation>
 </file>
 
@@ -254,7 +260,7 @@
           <a:p>
             <a:fld id="{13181F6F-3FE1-4563-87E6-7B6244C6104D}" type="datetimeFigureOut">
               <a:rPr lang="en-US" smtClean="0"/>
-              <a:t>5/11/2020</a:t>
+              <a:t>5/13/2020</a:t>
             </a:fld>
             <a:endParaRPr lang="en-US"/>
           </a:p>
@@ -452,7 +458,7 @@
           <a:p>
             <a:fld id="{13181F6F-3FE1-4563-87E6-7B6244C6104D}" type="datetimeFigureOut">
               <a:rPr lang="en-US" smtClean="0"/>
-              <a:t>5/11/2020</a:t>
+              <a:t>5/13/2020</a:t>
             </a:fld>
             <a:endParaRPr lang="en-US"/>
           </a:p>
@@ -660,7 +666,7 @@
           <a:p>
             <a:fld id="{13181F6F-3FE1-4563-87E6-7B6244C6104D}" type="datetimeFigureOut">
               <a:rPr lang="en-US" smtClean="0"/>
-              <a:t>5/11/2020</a:t>
+              <a:t>5/13/2020</a:t>
             </a:fld>
             <a:endParaRPr lang="en-US"/>
           </a:p>
@@ -858,7 +864,7 @@
           <a:p>
             <a:fld id="{13181F6F-3FE1-4563-87E6-7B6244C6104D}" type="datetimeFigureOut">
               <a:rPr lang="en-US" smtClean="0"/>
-              <a:t>5/11/2020</a:t>
+              <a:t>5/13/2020</a:t>
             </a:fld>
             <a:endParaRPr lang="en-US"/>
           </a:p>
@@ -1133,7 +1139,7 @@
           <a:p>
             <a:fld id="{13181F6F-3FE1-4563-87E6-7B6244C6104D}" type="datetimeFigureOut">
               <a:rPr lang="en-US" smtClean="0"/>
-              <a:t>5/11/2020</a:t>
+              <a:t>5/13/2020</a:t>
             </a:fld>
             <a:endParaRPr lang="en-US"/>
           </a:p>
@@ -1398,7 +1404,7 @@
           <a:p>
             <a:fld id="{13181F6F-3FE1-4563-87E6-7B6244C6104D}" type="datetimeFigureOut">
               <a:rPr lang="en-US" smtClean="0"/>
-              <a:t>5/11/2020</a:t>
+              <a:t>5/13/2020</a:t>
             </a:fld>
             <a:endParaRPr lang="en-US"/>
           </a:p>
@@ -1810,7 +1816,7 @@
           <a:p>
             <a:fld id="{13181F6F-3FE1-4563-87E6-7B6244C6104D}" type="datetimeFigureOut">
               <a:rPr lang="en-US" smtClean="0"/>
-              <a:t>5/11/2020</a:t>
+              <a:t>5/13/2020</a:t>
             </a:fld>
             <a:endParaRPr lang="en-US"/>
           </a:p>
@@ -1951,7 +1957,7 @@
           <a:p>
             <a:fld id="{13181F6F-3FE1-4563-87E6-7B6244C6104D}" type="datetimeFigureOut">
               <a:rPr lang="en-US" smtClean="0"/>
-              <a:t>5/11/2020</a:t>
+              <a:t>5/13/2020</a:t>
             </a:fld>
             <a:endParaRPr lang="en-US"/>
           </a:p>
@@ -2064,7 +2070,7 @@
           <a:p>
             <a:fld id="{13181F6F-3FE1-4563-87E6-7B6244C6104D}" type="datetimeFigureOut">
               <a:rPr lang="en-US" smtClean="0"/>
-              <a:t>5/11/2020</a:t>
+              <a:t>5/13/2020</a:t>
             </a:fld>
             <a:endParaRPr lang="en-US"/>
           </a:p>
@@ -2375,7 +2381,7 @@
           <a:p>
             <a:fld id="{13181F6F-3FE1-4563-87E6-7B6244C6104D}" type="datetimeFigureOut">
               <a:rPr lang="en-US" smtClean="0"/>
-              <a:t>5/11/2020</a:t>
+              <a:t>5/13/2020</a:t>
             </a:fld>
             <a:endParaRPr lang="en-US"/>
           </a:p>
@@ -2663,7 +2669,7 @@
           <a:p>
             <a:fld id="{13181F6F-3FE1-4563-87E6-7B6244C6104D}" type="datetimeFigureOut">
               <a:rPr lang="en-US" smtClean="0"/>
-              <a:t>5/11/2020</a:t>
+              <a:t>5/13/2020</a:t>
             </a:fld>
             <a:endParaRPr lang="en-US"/>
           </a:p>
@@ -2904,7 +2910,7 @@
           <a:p>
             <a:fld id="{13181F6F-3FE1-4563-87E6-7B6244C6104D}" type="datetimeFigureOut">
               <a:rPr lang="en-US" smtClean="0"/>
-              <a:t>5/11/2020</a:t>
+              <a:t>5/13/2020</a:t>
             </a:fld>
             <a:endParaRPr lang="en-US"/>
           </a:p>
@@ -4536,6 +4542,630 @@
 </p:sld>
 </file>
 
+<file path=ppt/slides/slide2.xml><?xml version="1.0" encoding="utf-8"?>
+<p:sld xmlns:a="http://schemas.openxmlformats.org/drawingml/2006/main" xmlns:r="http://schemas.openxmlformats.org/officeDocument/2006/relationships" xmlns:p="http://schemas.openxmlformats.org/presentationml/2006/main">
+  <p:cSld>
+    <p:spTree>
+      <p:nvGrpSpPr>
+        <p:cNvPr id="1" name=""/>
+        <p:cNvGrpSpPr/>
+        <p:nvPr/>
+      </p:nvGrpSpPr>
+      <p:grpSpPr>
+        <a:xfrm>
+          <a:off x="0" y="0"/>
+          <a:ext cx="0" cy="0"/>
+          <a:chOff x="0" y="0"/>
+          <a:chExt cx="0" cy="0"/>
+        </a:xfrm>
+      </p:grpSpPr>
+      <p:grpSp>
+        <p:nvGrpSpPr>
+          <p:cNvPr id="41" name="Group 40">
+            <a:extLst>
+              <a:ext uri="{FF2B5EF4-FFF2-40B4-BE49-F238E27FC236}">
+                <a16:creationId xmlns:a16="http://schemas.microsoft.com/office/drawing/2014/main" id="{B331F0B9-2C76-4855-BBA1-E1AEFDA46876}"/>
+              </a:ext>
+            </a:extLst>
+          </p:cNvPr>
+          <p:cNvGrpSpPr/>
+          <p:nvPr/>
+        </p:nvGrpSpPr>
+        <p:grpSpPr>
+          <a:xfrm>
+            <a:off x="1880647" y="1938163"/>
+            <a:ext cx="2899917" cy="3370246"/>
+            <a:chOff x="1880647" y="1938163"/>
+            <a:chExt cx="2899917" cy="3370246"/>
+          </a:xfrm>
+        </p:grpSpPr>
+        <p:sp>
+          <p:nvSpPr>
+            <p:cNvPr id="6" name="Oval 5">
+              <a:extLst>
+                <a:ext uri="{FF2B5EF4-FFF2-40B4-BE49-F238E27FC236}">
+                  <a16:creationId xmlns:a16="http://schemas.microsoft.com/office/drawing/2014/main" id="{4932EF1B-D073-45CA-9D5C-8943615266F0}"/>
+                </a:ext>
+              </a:extLst>
+            </p:cNvPr>
+            <p:cNvSpPr/>
+            <p:nvPr/>
+          </p:nvSpPr>
+          <p:spPr>
+            <a:xfrm>
+              <a:off x="1880647" y="4868945"/>
+              <a:ext cx="174395" cy="174395"/>
+            </a:xfrm>
+            <a:prstGeom prst="ellipse">
+              <a:avLst/>
+            </a:prstGeom>
+          </p:spPr>
+          <p:style>
+            <a:lnRef idx="2">
+              <a:schemeClr val="accent2">
+                <a:shade val="50000"/>
+              </a:schemeClr>
+            </a:lnRef>
+            <a:fillRef idx="1">
+              <a:schemeClr val="accent2"/>
+            </a:fillRef>
+            <a:effectRef idx="0">
+              <a:schemeClr val="accent2"/>
+            </a:effectRef>
+            <a:fontRef idx="minor">
+              <a:schemeClr val="lt1"/>
+            </a:fontRef>
+          </p:style>
+          <p:txBody>
+            <a:bodyPr rtlCol="0" anchor="ctr"/>
+            <a:lstStyle/>
+            <a:p>
+              <a:pPr algn="ctr"/>
+              <a:endParaRPr lang="en-US" dirty="0"/>
+            </a:p>
+          </p:txBody>
+        </p:sp>
+        <p:sp>
+          <p:nvSpPr>
+            <p:cNvPr id="7" name="Oval 6">
+              <a:extLst>
+                <a:ext uri="{FF2B5EF4-FFF2-40B4-BE49-F238E27FC236}">
+                  <a16:creationId xmlns:a16="http://schemas.microsoft.com/office/drawing/2014/main" id="{13B7BD90-7E3D-480D-928B-DEDFBBA50215}"/>
+                </a:ext>
+              </a:extLst>
+            </p:cNvPr>
+            <p:cNvSpPr/>
+            <p:nvPr/>
+          </p:nvSpPr>
+          <p:spPr>
+            <a:xfrm>
+              <a:off x="2426852" y="3774493"/>
+              <a:ext cx="174395" cy="174395"/>
+            </a:xfrm>
+            <a:prstGeom prst="ellipse">
+              <a:avLst/>
+            </a:prstGeom>
+          </p:spPr>
+          <p:style>
+            <a:lnRef idx="2">
+              <a:schemeClr val="accent1">
+                <a:shade val="50000"/>
+              </a:schemeClr>
+            </a:lnRef>
+            <a:fillRef idx="1">
+              <a:schemeClr val="accent1"/>
+            </a:fillRef>
+            <a:effectRef idx="0">
+              <a:schemeClr val="accent1"/>
+            </a:effectRef>
+            <a:fontRef idx="minor">
+              <a:schemeClr val="lt1"/>
+            </a:fontRef>
+          </p:style>
+          <p:txBody>
+            <a:bodyPr rtlCol="0" anchor="ctr"/>
+            <a:lstStyle/>
+            <a:p>
+              <a:pPr algn="ctr"/>
+              <a:endParaRPr lang="en-US"/>
+            </a:p>
+          </p:txBody>
+        </p:sp>
+        <p:sp>
+          <p:nvSpPr>
+            <p:cNvPr id="8" name="Oval 7">
+              <a:extLst>
+                <a:ext uri="{FF2B5EF4-FFF2-40B4-BE49-F238E27FC236}">
+                  <a16:creationId xmlns:a16="http://schemas.microsoft.com/office/drawing/2014/main" id="{EDE52BA9-1649-4335-B2ED-2E0524CF5906}"/>
+                </a:ext>
+              </a:extLst>
+            </p:cNvPr>
+            <p:cNvSpPr/>
+            <p:nvPr/>
+          </p:nvSpPr>
+          <p:spPr>
+            <a:xfrm>
+              <a:off x="2887429" y="2854437"/>
+              <a:ext cx="174395" cy="174395"/>
+            </a:xfrm>
+            <a:prstGeom prst="ellipse">
+              <a:avLst/>
+            </a:prstGeom>
+          </p:spPr>
+          <p:style>
+            <a:lnRef idx="2">
+              <a:schemeClr val="accent1">
+                <a:shade val="50000"/>
+              </a:schemeClr>
+            </a:lnRef>
+            <a:fillRef idx="1">
+              <a:schemeClr val="accent1"/>
+            </a:fillRef>
+            <a:effectRef idx="0">
+              <a:schemeClr val="accent1"/>
+            </a:effectRef>
+            <a:fontRef idx="minor">
+              <a:schemeClr val="lt1"/>
+            </a:fontRef>
+          </p:style>
+          <p:txBody>
+            <a:bodyPr rtlCol="0" anchor="ctr"/>
+            <a:lstStyle/>
+            <a:p>
+              <a:pPr algn="ctr"/>
+              <a:endParaRPr lang="en-US"/>
+            </a:p>
+          </p:txBody>
+        </p:sp>
+        <p:sp>
+          <p:nvSpPr>
+            <p:cNvPr id="9" name="Oval 8">
+              <a:extLst>
+                <a:ext uri="{FF2B5EF4-FFF2-40B4-BE49-F238E27FC236}">
+                  <a16:creationId xmlns:a16="http://schemas.microsoft.com/office/drawing/2014/main" id="{97A40B46-FFC2-4AF3-8A09-C04629BFDB39}"/>
+                </a:ext>
+              </a:extLst>
+            </p:cNvPr>
+            <p:cNvSpPr/>
+            <p:nvPr/>
+          </p:nvSpPr>
+          <p:spPr>
+            <a:xfrm>
+              <a:off x="3366154" y="1973974"/>
+              <a:ext cx="174395" cy="174395"/>
+            </a:xfrm>
+            <a:prstGeom prst="ellipse">
+              <a:avLst/>
+            </a:prstGeom>
+          </p:spPr>
+          <p:style>
+            <a:lnRef idx="2">
+              <a:schemeClr val="accent1">
+                <a:shade val="50000"/>
+              </a:schemeClr>
+            </a:lnRef>
+            <a:fillRef idx="1">
+              <a:schemeClr val="accent1"/>
+            </a:fillRef>
+            <a:effectRef idx="0">
+              <a:schemeClr val="accent1"/>
+            </a:effectRef>
+            <a:fontRef idx="minor">
+              <a:schemeClr val="lt1"/>
+            </a:fontRef>
+          </p:style>
+          <p:txBody>
+            <a:bodyPr rtlCol="0" anchor="ctr"/>
+            <a:lstStyle/>
+            <a:p>
+              <a:pPr algn="ctr"/>
+              <a:endParaRPr lang="en-US"/>
+            </a:p>
+          </p:txBody>
+        </p:sp>
+        <p:cxnSp>
+          <p:nvCxnSpPr>
+            <p:cNvPr id="12" name="Straight Arrow Connector 11">
+              <a:extLst>
+                <a:ext uri="{FF2B5EF4-FFF2-40B4-BE49-F238E27FC236}">
+                  <a16:creationId xmlns:a16="http://schemas.microsoft.com/office/drawing/2014/main" id="{3149775F-A575-41A6-8D47-AED8BE056907}"/>
+                </a:ext>
+              </a:extLst>
+            </p:cNvPr>
+            <p:cNvCxnSpPr>
+              <a:cxnSpLocks/>
+              <a:stCxn id="6" idx="7"/>
+              <a:endCxn id="7" idx="4"/>
+            </p:cNvCxnSpPr>
+            <p:nvPr/>
+          </p:nvCxnSpPr>
+          <p:spPr>
+            <a:xfrm flipV="1">
+              <a:off x="2029502" y="3948888"/>
+              <a:ext cx="484548" cy="945597"/>
+            </a:xfrm>
+            <a:prstGeom prst="straightConnector1">
+              <a:avLst/>
+            </a:prstGeom>
+            <a:ln>
+              <a:tailEnd type="triangle"/>
+            </a:ln>
+          </p:spPr>
+          <p:style>
+            <a:lnRef idx="2">
+              <a:schemeClr val="accent1"/>
+            </a:lnRef>
+            <a:fillRef idx="0">
+              <a:schemeClr val="accent1"/>
+            </a:fillRef>
+            <a:effectRef idx="1">
+              <a:schemeClr val="accent1"/>
+            </a:effectRef>
+            <a:fontRef idx="minor">
+              <a:schemeClr val="tx1"/>
+            </a:fontRef>
+          </p:style>
+        </p:cxnSp>
+        <p:cxnSp>
+          <p:nvCxnSpPr>
+            <p:cNvPr id="13" name="Straight Arrow Connector 12">
+              <a:extLst>
+                <a:ext uri="{FF2B5EF4-FFF2-40B4-BE49-F238E27FC236}">
+                  <a16:creationId xmlns:a16="http://schemas.microsoft.com/office/drawing/2014/main" id="{B4240BA4-050C-4C4E-B0E4-954E7D038665}"/>
+                </a:ext>
+              </a:extLst>
+            </p:cNvPr>
+            <p:cNvCxnSpPr>
+              <a:cxnSpLocks/>
+              <a:stCxn id="7" idx="7"/>
+              <a:endCxn id="8" idx="4"/>
+            </p:cNvCxnSpPr>
+            <p:nvPr/>
+          </p:nvCxnSpPr>
+          <p:spPr>
+            <a:xfrm flipV="1">
+              <a:off x="2575707" y="3028832"/>
+              <a:ext cx="398920" cy="771201"/>
+            </a:xfrm>
+            <a:prstGeom prst="straightConnector1">
+              <a:avLst/>
+            </a:prstGeom>
+            <a:ln>
+              <a:tailEnd type="triangle"/>
+            </a:ln>
+          </p:spPr>
+          <p:style>
+            <a:lnRef idx="2">
+              <a:schemeClr val="accent1"/>
+            </a:lnRef>
+            <a:fillRef idx="0">
+              <a:schemeClr val="accent1"/>
+            </a:fillRef>
+            <a:effectRef idx="1">
+              <a:schemeClr val="accent1"/>
+            </a:effectRef>
+            <a:fontRef idx="minor">
+              <a:schemeClr val="tx1"/>
+            </a:fontRef>
+          </p:style>
+        </p:cxnSp>
+        <p:cxnSp>
+          <p:nvCxnSpPr>
+            <p:cNvPr id="14" name="Straight Arrow Connector 13">
+              <a:extLst>
+                <a:ext uri="{FF2B5EF4-FFF2-40B4-BE49-F238E27FC236}">
+                  <a16:creationId xmlns:a16="http://schemas.microsoft.com/office/drawing/2014/main" id="{E3D43C90-F5BF-49AC-8D27-95EA10A3E7C0}"/>
+                </a:ext>
+              </a:extLst>
+            </p:cNvPr>
+            <p:cNvCxnSpPr>
+              <a:cxnSpLocks/>
+              <a:stCxn id="8" idx="7"/>
+              <a:endCxn id="9" idx="3"/>
+            </p:cNvCxnSpPr>
+            <p:nvPr/>
+          </p:nvCxnSpPr>
+          <p:spPr>
+            <a:xfrm flipV="1">
+              <a:off x="3036284" y="2122829"/>
+              <a:ext cx="355410" cy="757148"/>
+            </a:xfrm>
+            <a:prstGeom prst="straightConnector1">
+              <a:avLst/>
+            </a:prstGeom>
+            <a:ln>
+              <a:tailEnd type="triangle"/>
+            </a:ln>
+          </p:spPr>
+          <p:style>
+            <a:lnRef idx="2">
+              <a:schemeClr val="accent1"/>
+            </a:lnRef>
+            <a:fillRef idx="0">
+              <a:schemeClr val="accent1"/>
+            </a:fillRef>
+            <a:effectRef idx="1">
+              <a:schemeClr val="accent1"/>
+            </a:effectRef>
+            <a:fontRef idx="minor">
+              <a:schemeClr val="tx1"/>
+            </a:fontRef>
+          </p:style>
+        </p:cxnSp>
+        <p:sp>
+          <p:nvSpPr>
+            <p:cNvPr id="32" name="TextBox 31">
+              <a:extLst>
+                <a:ext uri="{FF2B5EF4-FFF2-40B4-BE49-F238E27FC236}">
+                  <a16:creationId xmlns:a16="http://schemas.microsoft.com/office/drawing/2014/main" id="{97795EF1-1AE4-42FB-86BE-0ABA9E1D254C}"/>
+                </a:ext>
+              </a:extLst>
+            </p:cNvPr>
+            <p:cNvSpPr txBox="1"/>
+            <p:nvPr/>
+          </p:nvSpPr>
+          <p:spPr>
+            <a:xfrm>
+              <a:off x="2218342" y="4662078"/>
+              <a:ext cx="1620934" cy="646331"/>
+            </a:xfrm>
+            <a:prstGeom prst="rect">
+              <a:avLst/>
+            </a:prstGeom>
+            <a:noFill/>
+          </p:spPr>
+          <p:txBody>
+            <a:bodyPr wrap="square" rtlCol="0">
+              <a:spAutoFit/>
+            </a:bodyPr>
+            <a:lstStyle/>
+            <a:p>
+              <a:r>
+                <a:rPr lang="en-US" dirty="0"/>
+                <a:t>O (has 3 tests in refrigerator)</a:t>
+              </a:r>
+            </a:p>
+          </p:txBody>
+        </p:sp>
+        <p:sp>
+          <p:nvSpPr>
+            <p:cNvPr id="33" name="TextBox 32">
+              <a:extLst>
+                <a:ext uri="{FF2B5EF4-FFF2-40B4-BE49-F238E27FC236}">
+                  <a16:creationId xmlns:a16="http://schemas.microsoft.com/office/drawing/2014/main" id="{89161F9A-2E60-49DC-9F9F-E197A3C84572}"/>
+                </a:ext>
+              </a:extLst>
+            </p:cNvPr>
+            <p:cNvSpPr txBox="1"/>
+            <p:nvPr/>
+          </p:nvSpPr>
+          <p:spPr>
+            <a:xfrm>
+              <a:off x="2669126" y="3742022"/>
+              <a:ext cx="1620934" cy="369332"/>
+            </a:xfrm>
+            <a:prstGeom prst="rect">
+              <a:avLst/>
+            </a:prstGeom>
+            <a:noFill/>
+          </p:spPr>
+          <p:txBody>
+            <a:bodyPr wrap="square" rtlCol="0">
+              <a:spAutoFit/>
+            </a:bodyPr>
+            <a:lstStyle/>
+            <a:p>
+              <a:r>
+                <a:rPr lang="en-US" dirty="0"/>
+                <a:t>Lab (1 </a:t>
+              </a:r>
+              <a:r>
+                <a:rPr lang="en-US" dirty="0" err="1"/>
+                <a:t>matosh</a:t>
+              </a:r>
+              <a:r>
+                <a:rPr lang="en-US" dirty="0"/>
+                <a:t>)</a:t>
+              </a:r>
+            </a:p>
+          </p:txBody>
+        </p:sp>
+        <p:sp>
+          <p:nvSpPr>
+            <p:cNvPr id="34" name="TextBox 33">
+              <a:extLst>
+                <a:ext uri="{FF2B5EF4-FFF2-40B4-BE49-F238E27FC236}">
+                  <a16:creationId xmlns:a16="http://schemas.microsoft.com/office/drawing/2014/main" id="{66A633C7-3650-404F-8809-DDC4546C7E6F}"/>
+                </a:ext>
+              </a:extLst>
+            </p:cNvPr>
+            <p:cNvSpPr txBox="1"/>
+            <p:nvPr/>
+          </p:nvSpPr>
+          <p:spPr>
+            <a:xfrm>
+              <a:off x="2873599" y="2216865"/>
+              <a:ext cx="600961" cy="369332"/>
+            </a:xfrm>
+            <a:prstGeom prst="rect">
+              <a:avLst/>
+            </a:prstGeom>
+            <a:noFill/>
+          </p:spPr>
+          <p:txBody>
+            <a:bodyPr wrap="square" rtlCol="0">
+              <a:spAutoFit/>
+            </a:bodyPr>
+            <a:lstStyle/>
+            <a:p>
+              <a:r>
+                <a:rPr lang="en-US" dirty="0"/>
+                <a:t>z</a:t>
+              </a:r>
+            </a:p>
+          </p:txBody>
+        </p:sp>
+        <p:sp>
+          <p:nvSpPr>
+            <p:cNvPr id="35" name="TextBox 34">
+              <a:extLst>
+                <a:ext uri="{FF2B5EF4-FFF2-40B4-BE49-F238E27FC236}">
+                  <a16:creationId xmlns:a16="http://schemas.microsoft.com/office/drawing/2014/main" id="{F870ABE4-6974-44B9-A6B7-576EE9CE86E4}"/>
+                </a:ext>
+              </a:extLst>
+            </p:cNvPr>
+            <p:cNvSpPr txBox="1"/>
+            <p:nvPr/>
+          </p:nvSpPr>
+          <p:spPr>
+            <a:xfrm>
+              <a:off x="3159630" y="2861559"/>
+              <a:ext cx="1620934" cy="646331"/>
+            </a:xfrm>
+            <a:prstGeom prst="rect">
+              <a:avLst/>
+            </a:prstGeom>
+            <a:noFill/>
+          </p:spPr>
+          <p:txBody>
+            <a:bodyPr wrap="square" rtlCol="0">
+              <a:spAutoFit/>
+            </a:bodyPr>
+            <a:lstStyle/>
+            <a:p>
+              <a:r>
+                <a:rPr lang="en-US" dirty="0" err="1"/>
+                <a:t>Appartment</a:t>
+              </a:r>
+              <a:endParaRPr lang="en-US" dirty="0"/>
+            </a:p>
+            <a:p>
+              <a:r>
+                <a:rPr lang="en-US" dirty="0"/>
+                <a:t> (1 roommate)</a:t>
+              </a:r>
+            </a:p>
+          </p:txBody>
+        </p:sp>
+        <p:sp>
+          <p:nvSpPr>
+            <p:cNvPr id="36" name="TextBox 35">
+              <a:extLst>
+                <a:ext uri="{FF2B5EF4-FFF2-40B4-BE49-F238E27FC236}">
+                  <a16:creationId xmlns:a16="http://schemas.microsoft.com/office/drawing/2014/main" id="{075644BB-ABB1-427B-AD98-043375582177}"/>
+                </a:ext>
+              </a:extLst>
+            </p:cNvPr>
+            <p:cNvSpPr txBox="1"/>
+            <p:nvPr/>
+          </p:nvSpPr>
+          <p:spPr>
+            <a:xfrm>
+              <a:off x="2478306" y="3184526"/>
+              <a:ext cx="600961" cy="369332"/>
+            </a:xfrm>
+            <a:prstGeom prst="rect">
+              <a:avLst/>
+            </a:prstGeom>
+            <a:noFill/>
+          </p:spPr>
+          <p:txBody>
+            <a:bodyPr wrap="square" rtlCol="0">
+              <a:spAutoFit/>
+            </a:bodyPr>
+            <a:lstStyle/>
+            <a:p>
+              <a:r>
+                <a:rPr lang="en-US" dirty="0"/>
+                <a:t>y</a:t>
+              </a:r>
+            </a:p>
+          </p:txBody>
+        </p:sp>
+        <p:sp>
+          <p:nvSpPr>
+            <p:cNvPr id="39" name="TextBox 38">
+              <a:extLst>
+                <a:ext uri="{FF2B5EF4-FFF2-40B4-BE49-F238E27FC236}">
+                  <a16:creationId xmlns:a16="http://schemas.microsoft.com/office/drawing/2014/main" id="{F40DDB8E-7E99-4461-878D-C0307A108D19}"/>
+                </a:ext>
+              </a:extLst>
+            </p:cNvPr>
+            <p:cNvSpPr txBox="1"/>
+            <p:nvPr/>
+          </p:nvSpPr>
+          <p:spPr>
+            <a:xfrm>
+              <a:off x="1975068" y="4182742"/>
+              <a:ext cx="600961" cy="369332"/>
+            </a:xfrm>
+            <a:prstGeom prst="rect">
+              <a:avLst/>
+            </a:prstGeom>
+            <a:noFill/>
+          </p:spPr>
+          <p:txBody>
+            <a:bodyPr wrap="square" rtlCol="0">
+              <a:spAutoFit/>
+            </a:bodyPr>
+            <a:lstStyle/>
+            <a:p>
+              <a:r>
+                <a:rPr lang="en-US" dirty="0"/>
+                <a:t>x</a:t>
+              </a:r>
+            </a:p>
+          </p:txBody>
+        </p:sp>
+        <p:sp>
+          <p:nvSpPr>
+            <p:cNvPr id="40" name="TextBox 39">
+              <a:extLst>
+                <a:ext uri="{FF2B5EF4-FFF2-40B4-BE49-F238E27FC236}">
+                  <a16:creationId xmlns:a16="http://schemas.microsoft.com/office/drawing/2014/main" id="{092EDCFB-A5CE-457E-AF5C-305CC38E26CD}"/>
+                </a:ext>
+              </a:extLst>
+            </p:cNvPr>
+            <p:cNvSpPr txBox="1"/>
+            <p:nvPr/>
+          </p:nvSpPr>
+          <p:spPr>
+            <a:xfrm>
+              <a:off x="3642195" y="1938163"/>
+              <a:ext cx="647865" cy="369332"/>
+            </a:xfrm>
+            <a:prstGeom prst="rect">
+              <a:avLst/>
+            </a:prstGeom>
+            <a:noFill/>
+          </p:spPr>
+          <p:txBody>
+            <a:bodyPr wrap="square" rtlCol="0">
+              <a:spAutoFit/>
+            </a:bodyPr>
+            <a:lstStyle/>
+            <a:p>
+              <a:r>
+                <a:rPr lang="en-US" dirty="0"/>
+                <a:t>Lab</a:t>
+              </a:r>
+            </a:p>
+          </p:txBody>
+        </p:sp>
+      </p:grpSp>
+    </p:spTree>
+    <p:extLst>
+      <p:ext uri="{BB962C8B-B14F-4D97-AF65-F5344CB8AC3E}">
+        <p14:creationId xmlns:p14="http://schemas.microsoft.com/office/powerpoint/2010/main" val="2372798438"/>
+      </p:ext>
+    </p:extLst>
+  </p:cSld>
+  <p:clrMapOvr>
+    <a:masterClrMapping/>
+  </p:clrMapOvr>
+</p:sld>
+</file>
+
 <file path=ppt/theme/theme1.xml><?xml version="1.0" encoding="utf-8"?>
 <a:theme xmlns:a="http://schemas.openxmlformats.org/drawingml/2006/main" name="Office Theme">
   <a:themeElements>

</xml_diff>

<commit_message>
32-37 (not all dry)
</commit_message>
<xml_diff>
--- a/hw_1/other/imgs.pptx
+++ b/hw_1/other/imgs.pptx
@@ -7,6 +7,7 @@
   <p:sldIdLst>
     <p:sldId id="256" r:id="rId2"/>
     <p:sldId id="257" r:id="rId3"/>
+    <p:sldId id="258" r:id="rId4"/>
   </p:sldIdLst>
   <p:sldSz cx="12192000" cy="6858000"/>
   <p:notesSz cx="6858000" cy="9144000"/>
@@ -260,7 +261,7 @@
           <a:p>
             <a:fld id="{13181F6F-3FE1-4563-87E6-7B6244C6104D}" type="datetimeFigureOut">
               <a:rPr lang="en-US" smtClean="0"/>
-              <a:t>5/13/2020</a:t>
+              <a:t>5/16/2020</a:t>
             </a:fld>
             <a:endParaRPr lang="en-US"/>
           </a:p>
@@ -458,7 +459,7 @@
           <a:p>
             <a:fld id="{13181F6F-3FE1-4563-87E6-7B6244C6104D}" type="datetimeFigureOut">
               <a:rPr lang="en-US" smtClean="0"/>
-              <a:t>5/13/2020</a:t>
+              <a:t>5/16/2020</a:t>
             </a:fld>
             <a:endParaRPr lang="en-US"/>
           </a:p>
@@ -666,7 +667,7 @@
           <a:p>
             <a:fld id="{13181F6F-3FE1-4563-87E6-7B6244C6104D}" type="datetimeFigureOut">
               <a:rPr lang="en-US" smtClean="0"/>
-              <a:t>5/13/2020</a:t>
+              <a:t>5/16/2020</a:t>
             </a:fld>
             <a:endParaRPr lang="en-US"/>
           </a:p>
@@ -864,7 +865,7 @@
           <a:p>
             <a:fld id="{13181F6F-3FE1-4563-87E6-7B6244C6104D}" type="datetimeFigureOut">
               <a:rPr lang="en-US" smtClean="0"/>
-              <a:t>5/13/2020</a:t>
+              <a:t>5/16/2020</a:t>
             </a:fld>
             <a:endParaRPr lang="en-US"/>
           </a:p>
@@ -1139,7 +1140,7 @@
           <a:p>
             <a:fld id="{13181F6F-3FE1-4563-87E6-7B6244C6104D}" type="datetimeFigureOut">
               <a:rPr lang="en-US" smtClean="0"/>
-              <a:t>5/13/2020</a:t>
+              <a:t>5/16/2020</a:t>
             </a:fld>
             <a:endParaRPr lang="en-US"/>
           </a:p>
@@ -1404,7 +1405,7 @@
           <a:p>
             <a:fld id="{13181F6F-3FE1-4563-87E6-7B6244C6104D}" type="datetimeFigureOut">
               <a:rPr lang="en-US" smtClean="0"/>
-              <a:t>5/13/2020</a:t>
+              <a:t>5/16/2020</a:t>
             </a:fld>
             <a:endParaRPr lang="en-US"/>
           </a:p>
@@ -1816,7 +1817,7 @@
           <a:p>
             <a:fld id="{13181F6F-3FE1-4563-87E6-7B6244C6104D}" type="datetimeFigureOut">
               <a:rPr lang="en-US" smtClean="0"/>
-              <a:t>5/13/2020</a:t>
+              <a:t>5/16/2020</a:t>
             </a:fld>
             <a:endParaRPr lang="en-US"/>
           </a:p>
@@ -1957,7 +1958,7 @@
           <a:p>
             <a:fld id="{13181F6F-3FE1-4563-87E6-7B6244C6104D}" type="datetimeFigureOut">
               <a:rPr lang="en-US" smtClean="0"/>
-              <a:t>5/13/2020</a:t>
+              <a:t>5/16/2020</a:t>
             </a:fld>
             <a:endParaRPr lang="en-US"/>
           </a:p>
@@ -2070,7 +2071,7 @@
           <a:p>
             <a:fld id="{13181F6F-3FE1-4563-87E6-7B6244C6104D}" type="datetimeFigureOut">
               <a:rPr lang="en-US" smtClean="0"/>
-              <a:t>5/13/2020</a:t>
+              <a:t>5/16/2020</a:t>
             </a:fld>
             <a:endParaRPr lang="en-US"/>
           </a:p>
@@ -2381,7 +2382,7 @@
           <a:p>
             <a:fld id="{13181F6F-3FE1-4563-87E6-7B6244C6104D}" type="datetimeFigureOut">
               <a:rPr lang="en-US" smtClean="0"/>
-              <a:t>5/13/2020</a:t>
+              <a:t>5/16/2020</a:t>
             </a:fld>
             <a:endParaRPr lang="en-US"/>
           </a:p>
@@ -2669,7 +2670,7 @@
           <a:p>
             <a:fld id="{13181F6F-3FE1-4563-87E6-7B6244C6104D}" type="datetimeFigureOut">
               <a:rPr lang="en-US" smtClean="0"/>
-              <a:t>5/13/2020</a:t>
+              <a:t>5/16/2020</a:t>
             </a:fld>
             <a:endParaRPr lang="en-US"/>
           </a:p>
@@ -2910,7 +2911,7 @@
           <a:p>
             <a:fld id="{13181F6F-3FE1-4563-87E6-7B6244C6104D}" type="datetimeFigureOut">
               <a:rPr lang="en-US" smtClean="0"/>
-              <a:t>5/13/2020</a:t>
+              <a:t>5/16/2020</a:t>
             </a:fld>
             <a:endParaRPr lang="en-US"/>
           </a:p>
@@ -5166,6 +5167,546 @@
 </p:sld>
 </file>
 
+<file path=ppt/slides/slide3.xml><?xml version="1.0" encoding="utf-8"?>
+<p:sld xmlns:a="http://schemas.openxmlformats.org/drawingml/2006/main" xmlns:r="http://schemas.openxmlformats.org/officeDocument/2006/relationships" xmlns:p="http://schemas.openxmlformats.org/presentationml/2006/main">
+  <p:cSld>
+    <p:spTree>
+      <p:nvGrpSpPr>
+        <p:cNvPr id="1" name=""/>
+        <p:cNvGrpSpPr/>
+        <p:nvPr/>
+      </p:nvGrpSpPr>
+      <p:grpSpPr>
+        <a:xfrm>
+          <a:off x="0" y="0"/>
+          <a:ext cx="0" cy="0"/>
+          <a:chOff x="0" y="0"/>
+          <a:chExt cx="0" cy="0"/>
+        </a:xfrm>
+      </p:grpSpPr>
+      <p:grpSp>
+        <p:nvGrpSpPr>
+          <p:cNvPr id="30" name="Group 29">
+            <a:extLst>
+              <a:ext uri="{FF2B5EF4-FFF2-40B4-BE49-F238E27FC236}">
+                <a16:creationId xmlns:a16="http://schemas.microsoft.com/office/drawing/2014/main" id="{8D699241-5768-477E-AF8F-F73A4FF5804D}"/>
+              </a:ext>
+            </a:extLst>
+          </p:cNvPr>
+          <p:cNvGrpSpPr/>
+          <p:nvPr/>
+        </p:nvGrpSpPr>
+        <p:grpSpPr>
+          <a:xfrm>
+            <a:off x="946437" y="2782669"/>
+            <a:ext cx="3951386" cy="3000324"/>
+            <a:chOff x="946437" y="2782669"/>
+            <a:chExt cx="3951386" cy="3000324"/>
+          </a:xfrm>
+        </p:grpSpPr>
+        <p:sp>
+          <p:nvSpPr>
+            <p:cNvPr id="5" name="Oval 4">
+              <a:extLst>
+                <a:ext uri="{FF2B5EF4-FFF2-40B4-BE49-F238E27FC236}">
+                  <a16:creationId xmlns:a16="http://schemas.microsoft.com/office/drawing/2014/main" id="{56543925-8E2B-40D1-A8D3-311C95734D43}"/>
+                </a:ext>
+              </a:extLst>
+            </p:cNvPr>
+            <p:cNvSpPr/>
+            <p:nvPr/>
+          </p:nvSpPr>
+          <p:spPr>
+            <a:xfrm>
+              <a:off x="1880647" y="4868945"/>
+              <a:ext cx="174395" cy="174395"/>
+            </a:xfrm>
+            <a:prstGeom prst="ellipse">
+              <a:avLst/>
+            </a:prstGeom>
+          </p:spPr>
+          <p:style>
+            <a:lnRef idx="2">
+              <a:schemeClr val="accent2">
+                <a:shade val="50000"/>
+              </a:schemeClr>
+            </a:lnRef>
+            <a:fillRef idx="1">
+              <a:schemeClr val="accent2"/>
+            </a:fillRef>
+            <a:effectRef idx="0">
+              <a:schemeClr val="accent2"/>
+            </a:effectRef>
+            <a:fontRef idx="minor">
+              <a:schemeClr val="lt1"/>
+            </a:fontRef>
+          </p:style>
+          <p:txBody>
+            <a:bodyPr rtlCol="0" anchor="ctr"/>
+            <a:lstStyle/>
+            <a:p>
+              <a:pPr algn="ctr"/>
+              <a:endParaRPr lang="en-US" dirty="0"/>
+            </a:p>
+          </p:txBody>
+        </p:sp>
+        <p:sp>
+          <p:nvSpPr>
+            <p:cNvPr id="6" name="Oval 5">
+              <a:extLst>
+                <a:ext uri="{FF2B5EF4-FFF2-40B4-BE49-F238E27FC236}">
+                  <a16:creationId xmlns:a16="http://schemas.microsoft.com/office/drawing/2014/main" id="{20D5DB52-BD8D-4802-847C-E37708CCA1D2}"/>
+                </a:ext>
+              </a:extLst>
+            </p:cNvPr>
+            <p:cNvSpPr/>
+            <p:nvPr/>
+          </p:nvSpPr>
+          <p:spPr>
+            <a:xfrm>
+              <a:off x="1967844" y="3097328"/>
+              <a:ext cx="174395" cy="174395"/>
+            </a:xfrm>
+            <a:prstGeom prst="ellipse">
+              <a:avLst/>
+            </a:prstGeom>
+          </p:spPr>
+          <p:style>
+            <a:lnRef idx="2">
+              <a:schemeClr val="accent1">
+                <a:shade val="50000"/>
+              </a:schemeClr>
+            </a:lnRef>
+            <a:fillRef idx="1">
+              <a:schemeClr val="accent1"/>
+            </a:fillRef>
+            <a:effectRef idx="0">
+              <a:schemeClr val="accent1"/>
+            </a:effectRef>
+            <a:fontRef idx="minor">
+              <a:schemeClr val="lt1"/>
+            </a:fontRef>
+          </p:style>
+          <p:txBody>
+            <a:bodyPr rtlCol="0" anchor="ctr"/>
+            <a:lstStyle/>
+            <a:p>
+              <a:pPr algn="ctr"/>
+              <a:endParaRPr lang="en-US"/>
+            </a:p>
+          </p:txBody>
+        </p:sp>
+        <p:sp>
+          <p:nvSpPr>
+            <p:cNvPr id="7" name="Oval 6">
+              <a:extLst>
+                <a:ext uri="{FF2B5EF4-FFF2-40B4-BE49-F238E27FC236}">
+                  <a16:creationId xmlns:a16="http://schemas.microsoft.com/office/drawing/2014/main" id="{D4C83E46-2A65-4B36-9B65-99785801BD79}"/>
+                </a:ext>
+              </a:extLst>
+            </p:cNvPr>
+            <p:cNvSpPr/>
+            <p:nvPr/>
+          </p:nvSpPr>
+          <p:spPr>
+            <a:xfrm>
+              <a:off x="3966127" y="4865580"/>
+              <a:ext cx="174395" cy="174395"/>
+            </a:xfrm>
+            <a:prstGeom prst="ellipse">
+              <a:avLst/>
+            </a:prstGeom>
+          </p:spPr>
+          <p:style>
+            <a:lnRef idx="2">
+              <a:schemeClr val="accent1">
+                <a:shade val="50000"/>
+              </a:schemeClr>
+            </a:lnRef>
+            <a:fillRef idx="1">
+              <a:schemeClr val="accent1"/>
+            </a:fillRef>
+            <a:effectRef idx="0">
+              <a:schemeClr val="accent1"/>
+            </a:effectRef>
+            <a:fontRef idx="minor">
+              <a:schemeClr val="lt1"/>
+            </a:fontRef>
+          </p:style>
+          <p:txBody>
+            <a:bodyPr rtlCol="0" anchor="ctr"/>
+            <a:lstStyle/>
+            <a:p>
+              <a:pPr algn="ctr"/>
+              <a:endParaRPr lang="en-US"/>
+            </a:p>
+          </p:txBody>
+        </p:sp>
+        <p:cxnSp>
+          <p:nvCxnSpPr>
+            <p:cNvPr id="9" name="Straight Arrow Connector 8">
+              <a:extLst>
+                <a:ext uri="{FF2B5EF4-FFF2-40B4-BE49-F238E27FC236}">
+                  <a16:creationId xmlns:a16="http://schemas.microsoft.com/office/drawing/2014/main" id="{BBD8EA0B-1F99-4D6D-BD97-4FFCEE4AD700}"/>
+                </a:ext>
+              </a:extLst>
+            </p:cNvPr>
+            <p:cNvCxnSpPr>
+              <a:cxnSpLocks/>
+              <a:stCxn id="5" idx="7"/>
+              <a:endCxn id="6" idx="4"/>
+            </p:cNvCxnSpPr>
+            <p:nvPr/>
+          </p:nvCxnSpPr>
+          <p:spPr>
+            <a:xfrm flipV="1">
+              <a:off x="2029502" y="3271723"/>
+              <a:ext cx="25540" cy="1622762"/>
+            </a:xfrm>
+            <a:prstGeom prst="straightConnector1">
+              <a:avLst/>
+            </a:prstGeom>
+            <a:ln>
+              <a:tailEnd type="triangle"/>
+            </a:ln>
+          </p:spPr>
+          <p:style>
+            <a:lnRef idx="2">
+              <a:schemeClr val="accent1"/>
+            </a:lnRef>
+            <a:fillRef idx="0">
+              <a:schemeClr val="accent1"/>
+            </a:fillRef>
+            <a:effectRef idx="1">
+              <a:schemeClr val="accent1"/>
+            </a:effectRef>
+            <a:fontRef idx="minor">
+              <a:schemeClr val="tx1"/>
+            </a:fontRef>
+          </p:style>
+        </p:cxnSp>
+        <p:cxnSp>
+          <p:nvCxnSpPr>
+            <p:cNvPr id="10" name="Straight Arrow Connector 9">
+              <a:extLst>
+                <a:ext uri="{FF2B5EF4-FFF2-40B4-BE49-F238E27FC236}">
+                  <a16:creationId xmlns:a16="http://schemas.microsoft.com/office/drawing/2014/main" id="{34B465B1-01B2-4740-8FDB-A3419AE59DD8}"/>
+                </a:ext>
+              </a:extLst>
+            </p:cNvPr>
+            <p:cNvCxnSpPr>
+              <a:cxnSpLocks/>
+              <a:stCxn id="6" idx="7"/>
+              <a:endCxn id="7" idx="4"/>
+            </p:cNvCxnSpPr>
+            <p:nvPr/>
+          </p:nvCxnSpPr>
+          <p:spPr>
+            <a:xfrm>
+              <a:off x="2116699" y="3122868"/>
+              <a:ext cx="1936626" cy="1917107"/>
+            </a:xfrm>
+            <a:prstGeom prst="straightConnector1">
+              <a:avLst/>
+            </a:prstGeom>
+            <a:ln>
+              <a:tailEnd type="triangle"/>
+            </a:ln>
+          </p:spPr>
+          <p:style>
+            <a:lnRef idx="2">
+              <a:schemeClr val="accent1"/>
+            </a:lnRef>
+            <a:fillRef idx="0">
+              <a:schemeClr val="accent1"/>
+            </a:fillRef>
+            <a:effectRef idx="1">
+              <a:schemeClr val="accent1"/>
+            </a:effectRef>
+            <a:fontRef idx="minor">
+              <a:schemeClr val="tx1"/>
+            </a:fontRef>
+          </p:style>
+        </p:cxnSp>
+        <p:cxnSp>
+          <p:nvCxnSpPr>
+            <p:cNvPr id="11" name="Straight Arrow Connector 10">
+              <a:extLst>
+                <a:ext uri="{FF2B5EF4-FFF2-40B4-BE49-F238E27FC236}">
+                  <a16:creationId xmlns:a16="http://schemas.microsoft.com/office/drawing/2014/main" id="{F5DCE459-9A72-42EE-BEEB-C33E90CEE757}"/>
+                </a:ext>
+              </a:extLst>
+            </p:cNvPr>
+            <p:cNvCxnSpPr>
+              <a:cxnSpLocks/>
+              <a:stCxn id="5" idx="6"/>
+              <a:endCxn id="7" idx="2"/>
+            </p:cNvCxnSpPr>
+            <p:nvPr/>
+          </p:nvCxnSpPr>
+          <p:spPr>
+            <a:xfrm flipV="1">
+              <a:off x="2055042" y="4952778"/>
+              <a:ext cx="1911085" cy="3365"/>
+            </a:xfrm>
+            <a:prstGeom prst="straightConnector1">
+              <a:avLst/>
+            </a:prstGeom>
+            <a:ln>
+              <a:tailEnd type="triangle"/>
+            </a:ln>
+          </p:spPr>
+          <p:style>
+            <a:lnRef idx="2">
+              <a:schemeClr val="accent1"/>
+            </a:lnRef>
+            <a:fillRef idx="0">
+              <a:schemeClr val="accent1"/>
+            </a:fillRef>
+            <a:effectRef idx="1">
+              <a:schemeClr val="accent1"/>
+            </a:effectRef>
+            <a:fontRef idx="minor">
+              <a:schemeClr val="tx1"/>
+            </a:fontRef>
+          </p:style>
+        </p:cxnSp>
+        <p:sp>
+          <p:nvSpPr>
+            <p:cNvPr id="12" name="TextBox 11">
+              <a:extLst>
+                <a:ext uri="{FF2B5EF4-FFF2-40B4-BE49-F238E27FC236}">
+                  <a16:creationId xmlns:a16="http://schemas.microsoft.com/office/drawing/2014/main" id="{D5B8E43E-1609-4DDD-8764-A76A05CDD03F}"/>
+                </a:ext>
+              </a:extLst>
+            </p:cNvPr>
+            <p:cNvSpPr txBox="1"/>
+            <p:nvPr/>
+          </p:nvSpPr>
+          <p:spPr>
+            <a:xfrm>
+              <a:off x="946437" y="5136662"/>
+              <a:ext cx="3166469" cy="646331"/>
+            </a:xfrm>
+            <a:prstGeom prst="rect">
+              <a:avLst/>
+            </a:prstGeom>
+            <a:noFill/>
+          </p:spPr>
+          <p:txBody>
+            <a:bodyPr wrap="square" rtlCol="0">
+              <a:spAutoFit/>
+            </a:bodyPr>
+            <a:lstStyle/>
+            <a:p>
+              <a:r>
+                <a:rPr lang="en-US" dirty="0"/>
+                <a:t>O (has 4 tests in refrigerator, space for 2 more, 6 </a:t>
+              </a:r>
+              <a:r>
+                <a:rPr lang="en-US" dirty="0" err="1"/>
+                <a:t>matoshim</a:t>
+              </a:r>
+              <a:r>
+                <a:rPr lang="en-US" dirty="0"/>
+                <a:t>)</a:t>
+              </a:r>
+            </a:p>
+          </p:txBody>
+        </p:sp>
+        <p:sp>
+          <p:nvSpPr>
+            <p:cNvPr id="14" name="TextBox 13">
+              <a:extLst>
+                <a:ext uri="{FF2B5EF4-FFF2-40B4-BE49-F238E27FC236}">
+                  <a16:creationId xmlns:a16="http://schemas.microsoft.com/office/drawing/2014/main" id="{57062C22-8E1E-499D-B238-10E01EC79689}"/>
+                </a:ext>
+              </a:extLst>
+            </p:cNvPr>
+            <p:cNvSpPr txBox="1"/>
+            <p:nvPr/>
+          </p:nvSpPr>
+          <p:spPr>
+            <a:xfrm>
+              <a:off x="2744917" y="4595921"/>
+              <a:ext cx="600961" cy="369332"/>
+            </a:xfrm>
+            <a:prstGeom prst="rect">
+              <a:avLst/>
+            </a:prstGeom>
+            <a:noFill/>
+          </p:spPr>
+          <p:txBody>
+            <a:bodyPr wrap="square" rtlCol="0">
+              <a:spAutoFit/>
+            </a:bodyPr>
+            <a:lstStyle/>
+            <a:p>
+              <a:r>
+                <a:rPr lang="en-US" dirty="0"/>
+                <a:t>4</a:t>
+              </a:r>
+            </a:p>
+          </p:txBody>
+        </p:sp>
+        <p:sp>
+          <p:nvSpPr>
+            <p:cNvPr id="16" name="TextBox 15">
+              <a:extLst>
+                <a:ext uri="{FF2B5EF4-FFF2-40B4-BE49-F238E27FC236}">
+                  <a16:creationId xmlns:a16="http://schemas.microsoft.com/office/drawing/2014/main" id="{1EE9457B-DE51-4D19-A1E2-22E1A5DD6C22}"/>
+                </a:ext>
+              </a:extLst>
+            </p:cNvPr>
+            <p:cNvSpPr txBox="1"/>
+            <p:nvPr/>
+          </p:nvSpPr>
+          <p:spPr>
+            <a:xfrm>
+              <a:off x="3010584" y="3558253"/>
+              <a:ext cx="600961" cy="369332"/>
+            </a:xfrm>
+            <a:prstGeom prst="rect">
+              <a:avLst/>
+            </a:prstGeom>
+            <a:noFill/>
+          </p:spPr>
+          <p:txBody>
+            <a:bodyPr wrap="square" rtlCol="0">
+              <a:spAutoFit/>
+            </a:bodyPr>
+            <a:lstStyle/>
+            <a:p>
+              <a:r>
+                <a:rPr lang="en-US" dirty="0"/>
+                <a:t>5</a:t>
+              </a:r>
+            </a:p>
+          </p:txBody>
+        </p:sp>
+        <p:sp>
+          <p:nvSpPr>
+            <p:cNvPr id="17" name="TextBox 16">
+              <a:extLst>
+                <a:ext uri="{FF2B5EF4-FFF2-40B4-BE49-F238E27FC236}">
+                  <a16:creationId xmlns:a16="http://schemas.microsoft.com/office/drawing/2014/main" id="{7BBFE0F9-9C79-4D7D-BB02-16E0114662B2}"/>
+                </a:ext>
+              </a:extLst>
+            </p:cNvPr>
+            <p:cNvSpPr txBox="1"/>
+            <p:nvPr/>
+          </p:nvSpPr>
+          <p:spPr>
+            <a:xfrm>
+              <a:off x="1667363" y="3802351"/>
+              <a:ext cx="600961" cy="369332"/>
+            </a:xfrm>
+            <a:prstGeom prst="rect">
+              <a:avLst/>
+            </a:prstGeom>
+            <a:noFill/>
+          </p:spPr>
+          <p:txBody>
+            <a:bodyPr wrap="square" rtlCol="0">
+              <a:spAutoFit/>
+            </a:bodyPr>
+            <a:lstStyle/>
+            <a:p>
+              <a:r>
+                <a:rPr lang="en-US" dirty="0"/>
+                <a:t>3</a:t>
+              </a:r>
+            </a:p>
+          </p:txBody>
+        </p:sp>
+        <p:sp>
+          <p:nvSpPr>
+            <p:cNvPr id="18" name="TextBox 17">
+              <a:extLst>
+                <a:ext uri="{FF2B5EF4-FFF2-40B4-BE49-F238E27FC236}">
+                  <a16:creationId xmlns:a16="http://schemas.microsoft.com/office/drawing/2014/main" id="{BC5B77D8-55BF-4B8B-85BC-231C1AF9E0C4}"/>
+                </a:ext>
+              </a:extLst>
+            </p:cNvPr>
+            <p:cNvSpPr txBox="1"/>
+            <p:nvPr/>
+          </p:nvSpPr>
+          <p:spPr>
+            <a:xfrm>
+              <a:off x="4112906" y="4496248"/>
+              <a:ext cx="647865" cy="369332"/>
+            </a:xfrm>
+            <a:prstGeom prst="rect">
+              <a:avLst/>
+            </a:prstGeom>
+            <a:noFill/>
+          </p:spPr>
+          <p:txBody>
+            <a:bodyPr wrap="square" rtlCol="0">
+              <a:spAutoFit/>
+            </a:bodyPr>
+            <a:lstStyle/>
+            <a:p>
+              <a:r>
+                <a:rPr lang="en-US" dirty="0"/>
+                <a:t>Lab</a:t>
+              </a:r>
+            </a:p>
+          </p:txBody>
+        </p:sp>
+        <p:sp>
+          <p:nvSpPr>
+            <p:cNvPr id="29" name="TextBox 28">
+              <a:extLst>
+                <a:ext uri="{FF2B5EF4-FFF2-40B4-BE49-F238E27FC236}">
+                  <a16:creationId xmlns:a16="http://schemas.microsoft.com/office/drawing/2014/main" id="{63250ACF-364D-41C2-9254-A66D39A66F49}"/>
+                </a:ext>
+              </a:extLst>
+            </p:cNvPr>
+            <p:cNvSpPr txBox="1"/>
+            <p:nvPr/>
+          </p:nvSpPr>
+          <p:spPr>
+            <a:xfrm>
+              <a:off x="2325266" y="2782669"/>
+              <a:ext cx="2572557" cy="646331"/>
+            </a:xfrm>
+            <a:prstGeom prst="rect">
+              <a:avLst/>
+            </a:prstGeom>
+            <a:noFill/>
+          </p:spPr>
+          <p:txBody>
+            <a:bodyPr wrap="square" rtlCol="0">
+              <a:spAutoFit/>
+            </a:bodyPr>
+            <a:lstStyle/>
+            <a:p>
+              <a:r>
+                <a:rPr lang="en-US" dirty="0" err="1"/>
+                <a:t>Appartment</a:t>
+              </a:r>
+              <a:r>
+                <a:rPr lang="en-US" dirty="0"/>
+                <a:t> (2 roommates)</a:t>
+              </a:r>
+            </a:p>
+          </p:txBody>
+        </p:sp>
+      </p:grpSp>
+    </p:spTree>
+    <p:extLst>
+      <p:ext uri="{BB962C8B-B14F-4D97-AF65-F5344CB8AC3E}">
+        <p14:creationId xmlns:p14="http://schemas.microsoft.com/office/powerpoint/2010/main" val="1020948066"/>
+      </p:ext>
+    </p:extLst>
+  </p:cSld>
+  <p:clrMapOvr>
+    <a:masterClrMapping/>
+  </p:clrMapOvr>
+</p:sld>
+</file>
+
 <file path=ppt/theme/theme1.xml><?xml version="1.0" encoding="utf-8"?>
 <a:theme xmlns:a="http://schemas.openxmlformats.org/drawingml/2006/main" name="Office Theme">
   <a:themeElements>

</xml_diff>